<commit_message>
update Figures & train
</commit_message>
<xml_diff>
--- a/Figures/figure_S_spliceai_input/figure_spliceai_input.pptx
+++ b/Figures/figure_S_spliceai_input/figure_spliceai_input.pptx
@@ -2,7 +2,7 @@
 <file path=ppt/presentation.xml><?xml version="1.0" encoding="utf-8"?>
 <p:presentation xmlns:a="http://schemas.openxmlformats.org/drawingml/2006/main" xmlns:r="http://schemas.openxmlformats.org/officeDocument/2006/relationships" xmlns:p="http://schemas.openxmlformats.org/presentationml/2006/main" saveSubsetFonts="1" autoCompressPictures="0">
   <p:sldMasterIdLst>
-    <p:sldMasterId id="2147483684" r:id="rId1"/>
+    <p:sldMasterId id="2147483756" r:id="rId1"/>
   </p:sldMasterIdLst>
   <p:notesMasterIdLst>
     <p:notesMasterId r:id="rId3"/>
@@ -10,7 +10,7 @@
   <p:sldIdLst>
     <p:sldId id="313" r:id="rId2"/>
   </p:sldIdLst>
-  <p:sldSz cx="35999738" cy="14400213"/>
+  <p:sldSz cx="21599525" cy="12599988"/>
   <p:notesSz cx="6858000" cy="9144000"/>
   <p:defaultTextStyle>
     <a:defPPr>
@@ -197,7 +197,7 @@
           <a:p>
             <a:fld id="{DEE34097-28C4-B046-83B1-0F941A2B62B2}" type="datetimeFigureOut">
               <a:rPr lang="en-US" smtClean="0"/>
-              <a:t>7/13/23</a:t>
+              <a:t>7/18/23</a:t>
             </a:fld>
             <a:endParaRPr lang="en-US"/>
           </a:p>
@@ -215,8 +215,8 @@
         </p:nvSpPr>
         <p:spPr>
           <a:xfrm>
-            <a:off x="-427038" y="1143000"/>
-            <a:ext cx="7712076" cy="3086100"/>
+            <a:off x="784225" y="1143000"/>
+            <a:ext cx="5289550" cy="3086100"/>
           </a:xfrm>
           <a:prstGeom prst="rect">
             <a:avLst/>
@@ -371,8 +371,8 @@
   </p:cSld>
   <p:clrMap bg1="lt1" tx1="dk1" bg2="lt2" tx2="dk2" accent1="accent1" accent2="accent2" accent3="accent3" accent4="accent4" accent5="accent5" accent6="accent6" hlink="hlink" folHlink="folHlink"/>
   <p:notesStyle>
-    <a:lvl1pPr marL="0" algn="l" defTabSz="914400" rtl="0" eaLnBrk="1" latinLnBrk="0" hangingPunct="1">
-      <a:defRPr sz="1200" kern="1200">
+    <a:lvl1pPr marL="0" algn="l" defTabSz="646494" rtl="0" eaLnBrk="1" latinLnBrk="0" hangingPunct="1">
+      <a:defRPr sz="848" kern="1200">
         <a:solidFill>
           <a:schemeClr val="tx1"/>
         </a:solidFill>
@@ -381,8 +381,8 @@
         <a:cs typeface="+mn-cs"/>
       </a:defRPr>
     </a:lvl1pPr>
-    <a:lvl2pPr marL="457200" algn="l" defTabSz="914400" rtl="0" eaLnBrk="1" latinLnBrk="0" hangingPunct="1">
-      <a:defRPr sz="1200" kern="1200">
+    <a:lvl2pPr marL="323247" algn="l" defTabSz="646494" rtl="0" eaLnBrk="1" latinLnBrk="0" hangingPunct="1">
+      <a:defRPr sz="848" kern="1200">
         <a:solidFill>
           <a:schemeClr val="tx1"/>
         </a:solidFill>
@@ -391,8 +391,8 @@
         <a:cs typeface="+mn-cs"/>
       </a:defRPr>
     </a:lvl2pPr>
-    <a:lvl3pPr marL="914400" algn="l" defTabSz="914400" rtl="0" eaLnBrk="1" latinLnBrk="0" hangingPunct="1">
-      <a:defRPr sz="1200" kern="1200">
+    <a:lvl3pPr marL="646494" algn="l" defTabSz="646494" rtl="0" eaLnBrk="1" latinLnBrk="0" hangingPunct="1">
+      <a:defRPr sz="848" kern="1200">
         <a:solidFill>
           <a:schemeClr val="tx1"/>
         </a:solidFill>
@@ -401,8 +401,8 @@
         <a:cs typeface="+mn-cs"/>
       </a:defRPr>
     </a:lvl3pPr>
-    <a:lvl4pPr marL="1371600" algn="l" defTabSz="914400" rtl="0" eaLnBrk="1" latinLnBrk="0" hangingPunct="1">
-      <a:defRPr sz="1200" kern="1200">
+    <a:lvl4pPr marL="969741" algn="l" defTabSz="646494" rtl="0" eaLnBrk="1" latinLnBrk="0" hangingPunct="1">
+      <a:defRPr sz="848" kern="1200">
         <a:solidFill>
           <a:schemeClr val="tx1"/>
         </a:solidFill>
@@ -411,8 +411,8 @@
         <a:cs typeface="+mn-cs"/>
       </a:defRPr>
     </a:lvl4pPr>
-    <a:lvl5pPr marL="1828800" algn="l" defTabSz="914400" rtl="0" eaLnBrk="1" latinLnBrk="0" hangingPunct="1">
-      <a:defRPr sz="1200" kern="1200">
+    <a:lvl5pPr marL="1292989" algn="l" defTabSz="646494" rtl="0" eaLnBrk="1" latinLnBrk="0" hangingPunct="1">
+      <a:defRPr sz="848" kern="1200">
         <a:solidFill>
           <a:schemeClr val="tx1"/>
         </a:solidFill>
@@ -421,8 +421,8 @@
         <a:cs typeface="+mn-cs"/>
       </a:defRPr>
     </a:lvl5pPr>
-    <a:lvl6pPr marL="2286000" algn="l" defTabSz="914400" rtl="0" eaLnBrk="1" latinLnBrk="0" hangingPunct="1">
-      <a:defRPr sz="1200" kern="1200">
+    <a:lvl6pPr marL="1616236" algn="l" defTabSz="646494" rtl="0" eaLnBrk="1" latinLnBrk="0" hangingPunct="1">
+      <a:defRPr sz="848" kern="1200">
         <a:solidFill>
           <a:schemeClr val="tx1"/>
         </a:solidFill>
@@ -431,8 +431,8 @@
         <a:cs typeface="+mn-cs"/>
       </a:defRPr>
     </a:lvl6pPr>
-    <a:lvl7pPr marL="2743200" algn="l" defTabSz="914400" rtl="0" eaLnBrk="1" latinLnBrk="0" hangingPunct="1">
-      <a:defRPr sz="1200" kern="1200">
+    <a:lvl7pPr marL="1939483" algn="l" defTabSz="646494" rtl="0" eaLnBrk="1" latinLnBrk="0" hangingPunct="1">
+      <a:defRPr sz="848" kern="1200">
         <a:solidFill>
           <a:schemeClr val="tx1"/>
         </a:solidFill>
@@ -441,8 +441,8 @@
         <a:cs typeface="+mn-cs"/>
       </a:defRPr>
     </a:lvl7pPr>
-    <a:lvl8pPr marL="3200400" algn="l" defTabSz="914400" rtl="0" eaLnBrk="1" latinLnBrk="0" hangingPunct="1">
-      <a:defRPr sz="1200" kern="1200">
+    <a:lvl8pPr marL="2262730" algn="l" defTabSz="646494" rtl="0" eaLnBrk="1" latinLnBrk="0" hangingPunct="1">
+      <a:defRPr sz="848" kern="1200">
         <a:solidFill>
           <a:schemeClr val="tx1"/>
         </a:solidFill>
@@ -451,8 +451,8 @@
         <a:cs typeface="+mn-cs"/>
       </a:defRPr>
     </a:lvl8pPr>
-    <a:lvl9pPr marL="3657600" algn="l" defTabSz="914400" rtl="0" eaLnBrk="1" latinLnBrk="0" hangingPunct="1">
-      <a:defRPr sz="1200" kern="1200">
+    <a:lvl9pPr marL="2585977" algn="l" defTabSz="646494" rtl="0" eaLnBrk="1" latinLnBrk="0" hangingPunct="1">
+      <a:defRPr sz="848" kern="1200">
         <a:solidFill>
           <a:schemeClr val="tx1"/>
         </a:solidFill>
@@ -494,15 +494,15 @@
         </p:nvSpPr>
         <p:spPr>
           <a:xfrm>
-            <a:off x="4499967" y="2356703"/>
-            <a:ext cx="26999804" cy="5013407"/>
+            <a:off x="2699941" y="2062083"/>
+            <a:ext cx="16199644" cy="4386662"/>
           </a:xfrm>
         </p:spPr>
         <p:txBody>
           <a:bodyPr anchor="b"/>
           <a:lstStyle>
             <a:lvl1pPr algn="ctr">
-              <a:defRPr sz="12599"/>
+              <a:defRPr sz="10630"/>
             </a:lvl1pPr>
           </a:lstStyle>
           <a:p>
@@ -526,8 +526,8 @@
         </p:nvSpPr>
         <p:spPr>
           <a:xfrm>
-            <a:off x="4499967" y="7563446"/>
-            <a:ext cx="26999804" cy="3476717"/>
+            <a:off x="2699941" y="6617911"/>
+            <a:ext cx="16199644" cy="3042080"/>
           </a:xfrm>
         </p:spPr>
         <p:txBody>
@@ -535,39 +535,39 @@
           <a:lstStyle>
             <a:lvl1pPr marL="0" indent="0" algn="ctr">
               <a:buNone/>
-              <a:defRPr sz="5040"/>
+              <a:defRPr sz="4252"/>
             </a:lvl1pPr>
-            <a:lvl2pPr marL="960029" indent="0" algn="ctr">
+            <a:lvl2pPr marL="809976" indent="0" algn="ctr">
               <a:buNone/>
-              <a:defRPr sz="4200"/>
+              <a:defRPr sz="3543"/>
             </a:lvl2pPr>
-            <a:lvl3pPr marL="1920057" indent="0" algn="ctr">
+            <a:lvl3pPr marL="1619951" indent="0" algn="ctr">
               <a:buNone/>
-              <a:defRPr sz="3780"/>
+              <a:defRPr sz="3189"/>
             </a:lvl3pPr>
-            <a:lvl4pPr marL="2880086" indent="0" algn="ctr">
+            <a:lvl4pPr marL="2429927" indent="0" algn="ctr">
               <a:buNone/>
-              <a:defRPr sz="3360"/>
+              <a:defRPr sz="2835"/>
             </a:lvl4pPr>
-            <a:lvl5pPr marL="3840114" indent="0" algn="ctr">
+            <a:lvl5pPr marL="3239902" indent="0" algn="ctr">
               <a:buNone/>
-              <a:defRPr sz="3360"/>
+              <a:defRPr sz="2835"/>
             </a:lvl5pPr>
-            <a:lvl6pPr marL="4800143" indent="0" algn="ctr">
+            <a:lvl6pPr marL="4049878" indent="0" algn="ctr">
               <a:buNone/>
-              <a:defRPr sz="3360"/>
+              <a:defRPr sz="2835"/>
             </a:lvl6pPr>
-            <a:lvl7pPr marL="5760171" indent="0" algn="ctr">
+            <a:lvl7pPr marL="4859853" indent="0" algn="ctr">
               <a:buNone/>
-              <a:defRPr sz="3360"/>
+              <a:defRPr sz="2835"/>
             </a:lvl7pPr>
-            <a:lvl8pPr marL="6720200" indent="0" algn="ctr">
+            <a:lvl8pPr marL="5669829" indent="0" algn="ctr">
               <a:buNone/>
-              <a:defRPr sz="3360"/>
+              <a:defRPr sz="2835"/>
             </a:lvl8pPr>
-            <a:lvl9pPr marL="7680228" indent="0" algn="ctr">
+            <a:lvl9pPr marL="6479804" indent="0" algn="ctr">
               <a:buNone/>
-              <a:defRPr sz="3360"/>
+              <a:defRPr sz="2835"/>
             </a:lvl9pPr>
           </a:lstStyle>
           <a:p>
@@ -596,7 +596,7 @@
           <a:p>
             <a:fld id="{EB01C8D4-EBBE-DF44-8BBA-54ECEA52E7BA}" type="datetimeFigureOut">
               <a:rPr lang="en-US" smtClean="0"/>
-              <a:t>7/13/23</a:t>
+              <a:t>7/18/23</a:t>
             </a:fld>
             <a:endParaRPr lang="en-US"/>
           </a:p>
@@ -647,7 +647,7 @@
     </p:spTree>
     <p:extLst>
       <p:ext uri="{BB962C8B-B14F-4D97-AF65-F5344CB8AC3E}">
-        <p14:creationId xmlns:p14="http://schemas.microsoft.com/office/powerpoint/2010/main" val="3561779808"/>
+        <p14:creationId xmlns:p14="http://schemas.microsoft.com/office/powerpoint/2010/main" val="1427266224"/>
       </p:ext>
     </p:extLst>
   </p:cSld>
@@ -766,7 +766,7 @@
           <a:p>
             <a:fld id="{EB01C8D4-EBBE-DF44-8BBA-54ECEA52E7BA}" type="datetimeFigureOut">
               <a:rPr lang="en-US" smtClean="0"/>
-              <a:t>7/13/23</a:t>
+              <a:t>7/18/23</a:t>
             </a:fld>
             <a:endParaRPr lang="en-US"/>
           </a:p>
@@ -817,7 +817,7 @@
     </p:spTree>
     <p:extLst>
       <p:ext uri="{BB962C8B-B14F-4D97-AF65-F5344CB8AC3E}">
-        <p14:creationId xmlns:p14="http://schemas.microsoft.com/office/powerpoint/2010/main" val="2386930763"/>
+        <p14:creationId xmlns:p14="http://schemas.microsoft.com/office/powerpoint/2010/main" val="534991597"/>
       </p:ext>
     </p:extLst>
   </p:cSld>
@@ -856,8 +856,8 @@
         </p:nvSpPr>
         <p:spPr>
           <a:xfrm>
-            <a:off x="25762312" y="766678"/>
-            <a:ext cx="7762444" cy="12203515"/>
+            <a:off x="15457160" y="670833"/>
+            <a:ext cx="4657398" cy="10677907"/>
           </a:xfrm>
         </p:spPr>
         <p:txBody>
@@ -884,8 +884,8 @@
         </p:nvSpPr>
         <p:spPr>
           <a:xfrm>
-            <a:off x="2474982" y="766678"/>
-            <a:ext cx="22837334" cy="12203515"/>
+            <a:off x="1484967" y="670833"/>
+            <a:ext cx="13702199" cy="10677907"/>
           </a:xfrm>
         </p:spPr>
         <p:txBody>
@@ -946,7 +946,7 @@
           <a:p>
             <a:fld id="{EB01C8D4-EBBE-DF44-8BBA-54ECEA52E7BA}" type="datetimeFigureOut">
               <a:rPr lang="en-US" smtClean="0"/>
-              <a:t>7/13/23</a:t>
+              <a:t>7/18/23</a:t>
             </a:fld>
             <a:endParaRPr lang="en-US"/>
           </a:p>
@@ -997,7 +997,7 @@
     </p:spTree>
     <p:extLst>
       <p:ext uri="{BB962C8B-B14F-4D97-AF65-F5344CB8AC3E}">
-        <p14:creationId xmlns:p14="http://schemas.microsoft.com/office/powerpoint/2010/main" val="3412006608"/>
+        <p14:creationId xmlns:p14="http://schemas.microsoft.com/office/powerpoint/2010/main" val="1720410638"/>
       </p:ext>
     </p:extLst>
   </p:cSld>
@@ -1116,7 +1116,7 @@
           <a:p>
             <a:fld id="{EB01C8D4-EBBE-DF44-8BBA-54ECEA52E7BA}" type="datetimeFigureOut">
               <a:rPr lang="en-US" smtClean="0"/>
-              <a:t>7/13/23</a:t>
+              <a:t>7/18/23</a:t>
             </a:fld>
             <a:endParaRPr lang="en-US"/>
           </a:p>
@@ -1167,7 +1167,7 @@
     </p:spTree>
     <p:extLst>
       <p:ext uri="{BB962C8B-B14F-4D97-AF65-F5344CB8AC3E}">
-        <p14:creationId xmlns:p14="http://schemas.microsoft.com/office/powerpoint/2010/main" val="3915917600"/>
+        <p14:creationId xmlns:p14="http://schemas.microsoft.com/office/powerpoint/2010/main" val="738653518"/>
       </p:ext>
     </p:extLst>
   </p:cSld>
@@ -1206,15 +1206,15 @@
         </p:nvSpPr>
         <p:spPr>
           <a:xfrm>
-            <a:off x="2456232" y="3590055"/>
-            <a:ext cx="31049774" cy="5990088"/>
+            <a:off x="1473718" y="3141249"/>
+            <a:ext cx="18629590" cy="5241244"/>
           </a:xfrm>
         </p:spPr>
         <p:txBody>
           <a:bodyPr anchor="b"/>
           <a:lstStyle>
             <a:lvl1pPr>
-              <a:defRPr sz="12599"/>
+              <a:defRPr sz="10630"/>
             </a:lvl1pPr>
           </a:lstStyle>
           <a:p>
@@ -1238,8 +1238,8 @@
         </p:nvSpPr>
         <p:spPr>
           <a:xfrm>
-            <a:off x="2456232" y="9636811"/>
-            <a:ext cx="31049774" cy="3150046"/>
+            <a:off x="1473718" y="8432077"/>
+            <a:ext cx="18629590" cy="2756246"/>
           </a:xfrm>
         </p:spPr>
         <p:txBody>
@@ -1247,7 +1247,7 @@
           <a:lstStyle>
             <a:lvl1pPr marL="0" indent="0">
               <a:buNone/>
-              <a:defRPr sz="5040">
+              <a:defRPr sz="4252">
                 <a:solidFill>
                   <a:schemeClr val="tx1">
                     <a:tint val="75000"/>
@@ -1255,9 +1255,9 @@
                 </a:solidFill>
               </a:defRPr>
             </a:lvl1pPr>
-            <a:lvl2pPr marL="960029" indent="0">
+            <a:lvl2pPr marL="809976" indent="0">
               <a:buNone/>
-              <a:defRPr sz="4200">
+              <a:defRPr sz="3543">
                 <a:solidFill>
                   <a:schemeClr val="tx1">
                     <a:tint val="75000"/>
@@ -1265,9 +1265,9 @@
                 </a:solidFill>
               </a:defRPr>
             </a:lvl2pPr>
-            <a:lvl3pPr marL="1920057" indent="0">
+            <a:lvl3pPr marL="1619951" indent="0">
               <a:buNone/>
-              <a:defRPr sz="3780">
+              <a:defRPr sz="3189">
                 <a:solidFill>
                   <a:schemeClr val="tx1">
                     <a:tint val="75000"/>
@@ -1275,9 +1275,9 @@
                 </a:solidFill>
               </a:defRPr>
             </a:lvl3pPr>
-            <a:lvl4pPr marL="2880086" indent="0">
+            <a:lvl4pPr marL="2429927" indent="0">
               <a:buNone/>
-              <a:defRPr sz="3360">
+              <a:defRPr sz="2835">
                 <a:solidFill>
                   <a:schemeClr val="tx1">
                     <a:tint val="75000"/>
@@ -1285,9 +1285,9 @@
                 </a:solidFill>
               </a:defRPr>
             </a:lvl4pPr>
-            <a:lvl5pPr marL="3840114" indent="0">
+            <a:lvl5pPr marL="3239902" indent="0">
               <a:buNone/>
-              <a:defRPr sz="3360">
+              <a:defRPr sz="2835">
                 <a:solidFill>
                   <a:schemeClr val="tx1">
                     <a:tint val="75000"/>
@@ -1295,9 +1295,9 @@
                 </a:solidFill>
               </a:defRPr>
             </a:lvl5pPr>
-            <a:lvl6pPr marL="4800143" indent="0">
+            <a:lvl6pPr marL="4049878" indent="0">
               <a:buNone/>
-              <a:defRPr sz="3360">
+              <a:defRPr sz="2835">
                 <a:solidFill>
                   <a:schemeClr val="tx1">
                     <a:tint val="75000"/>
@@ -1305,9 +1305,9 @@
                 </a:solidFill>
               </a:defRPr>
             </a:lvl6pPr>
-            <a:lvl7pPr marL="5760171" indent="0">
+            <a:lvl7pPr marL="4859853" indent="0">
               <a:buNone/>
-              <a:defRPr sz="3360">
+              <a:defRPr sz="2835">
                 <a:solidFill>
                   <a:schemeClr val="tx1">
                     <a:tint val="75000"/>
@@ -1315,9 +1315,9 @@
                 </a:solidFill>
               </a:defRPr>
             </a:lvl7pPr>
-            <a:lvl8pPr marL="6720200" indent="0">
+            <a:lvl8pPr marL="5669829" indent="0">
               <a:buNone/>
-              <a:defRPr sz="3360">
+              <a:defRPr sz="2835">
                 <a:solidFill>
                   <a:schemeClr val="tx1">
                     <a:tint val="75000"/>
@@ -1325,9 +1325,9 @@
                 </a:solidFill>
               </a:defRPr>
             </a:lvl8pPr>
-            <a:lvl9pPr marL="7680228" indent="0">
+            <a:lvl9pPr marL="6479804" indent="0">
               <a:buNone/>
-              <a:defRPr sz="3360">
+              <a:defRPr sz="2835">
                 <a:solidFill>
                   <a:schemeClr val="tx1">
                     <a:tint val="75000"/>
@@ -1362,7 +1362,7 @@
           <a:p>
             <a:fld id="{EB01C8D4-EBBE-DF44-8BBA-54ECEA52E7BA}" type="datetimeFigureOut">
               <a:rPr lang="en-US" smtClean="0"/>
-              <a:t>7/13/23</a:t>
+              <a:t>7/18/23</a:t>
             </a:fld>
             <a:endParaRPr lang="en-US"/>
           </a:p>
@@ -1413,7 +1413,7 @@
     </p:spTree>
     <p:extLst>
       <p:ext uri="{BB962C8B-B14F-4D97-AF65-F5344CB8AC3E}">
-        <p14:creationId xmlns:p14="http://schemas.microsoft.com/office/powerpoint/2010/main" val="3608449955"/>
+        <p14:creationId xmlns:p14="http://schemas.microsoft.com/office/powerpoint/2010/main" val="3980415329"/>
       </p:ext>
     </p:extLst>
   </p:cSld>
@@ -1475,8 +1475,8 @@
         </p:nvSpPr>
         <p:spPr>
           <a:xfrm>
-            <a:off x="2474982" y="3833390"/>
-            <a:ext cx="15299889" cy="9136803"/>
+            <a:off x="1484967" y="3354163"/>
+            <a:ext cx="9179798" cy="7994577"/>
           </a:xfrm>
         </p:spPr>
         <p:txBody>
@@ -1532,8 +1532,8 @@
         </p:nvSpPr>
         <p:spPr>
           <a:xfrm>
-            <a:off x="18224867" y="3833390"/>
-            <a:ext cx="15299889" cy="9136803"/>
+            <a:off x="10934760" y="3354163"/>
+            <a:ext cx="9179798" cy="7994577"/>
           </a:xfrm>
         </p:spPr>
         <p:txBody>
@@ -1594,7 +1594,7 @@
           <a:p>
             <a:fld id="{EB01C8D4-EBBE-DF44-8BBA-54ECEA52E7BA}" type="datetimeFigureOut">
               <a:rPr lang="en-US" smtClean="0"/>
-              <a:t>7/13/23</a:t>
+              <a:t>7/18/23</a:t>
             </a:fld>
             <a:endParaRPr lang="en-US"/>
           </a:p>
@@ -1645,7 +1645,7 @@
     </p:spTree>
     <p:extLst>
       <p:ext uri="{BB962C8B-B14F-4D97-AF65-F5344CB8AC3E}">
-        <p14:creationId xmlns:p14="http://schemas.microsoft.com/office/powerpoint/2010/main" val="1227726336"/>
+        <p14:creationId xmlns:p14="http://schemas.microsoft.com/office/powerpoint/2010/main" val="2366832458"/>
       </p:ext>
     </p:extLst>
   </p:cSld>
@@ -1684,8 +1684,8 @@
         </p:nvSpPr>
         <p:spPr>
           <a:xfrm>
-            <a:off x="2479671" y="766679"/>
-            <a:ext cx="31049774" cy="2783376"/>
+            <a:off x="1487781" y="670834"/>
+            <a:ext cx="18629590" cy="2435415"/>
           </a:xfrm>
         </p:spPr>
         <p:txBody>
@@ -1712,8 +1712,8 @@
         </p:nvSpPr>
         <p:spPr>
           <a:xfrm>
-            <a:off x="2479672" y="3530053"/>
-            <a:ext cx="15229575" cy="1730025"/>
+            <a:off x="1487781" y="3088748"/>
+            <a:ext cx="9137611" cy="1513748"/>
           </a:xfrm>
         </p:spPr>
         <p:txBody>
@@ -1721,39 +1721,39 @@
           <a:lstStyle>
             <a:lvl1pPr marL="0" indent="0">
               <a:buNone/>
-              <a:defRPr sz="5040" b="1"/>
+              <a:defRPr sz="4252" b="1"/>
             </a:lvl1pPr>
-            <a:lvl2pPr marL="960029" indent="0">
+            <a:lvl2pPr marL="809976" indent="0">
               <a:buNone/>
-              <a:defRPr sz="4200" b="1"/>
+              <a:defRPr sz="3543" b="1"/>
             </a:lvl2pPr>
-            <a:lvl3pPr marL="1920057" indent="0">
+            <a:lvl3pPr marL="1619951" indent="0">
               <a:buNone/>
-              <a:defRPr sz="3780" b="1"/>
+              <a:defRPr sz="3189" b="1"/>
             </a:lvl3pPr>
-            <a:lvl4pPr marL="2880086" indent="0">
+            <a:lvl4pPr marL="2429927" indent="0">
               <a:buNone/>
-              <a:defRPr sz="3360" b="1"/>
+              <a:defRPr sz="2835" b="1"/>
             </a:lvl4pPr>
-            <a:lvl5pPr marL="3840114" indent="0">
+            <a:lvl5pPr marL="3239902" indent="0">
               <a:buNone/>
-              <a:defRPr sz="3360" b="1"/>
+              <a:defRPr sz="2835" b="1"/>
             </a:lvl5pPr>
-            <a:lvl6pPr marL="4800143" indent="0">
+            <a:lvl6pPr marL="4049878" indent="0">
               <a:buNone/>
-              <a:defRPr sz="3360" b="1"/>
+              <a:defRPr sz="2835" b="1"/>
             </a:lvl6pPr>
-            <a:lvl7pPr marL="5760171" indent="0">
+            <a:lvl7pPr marL="4859853" indent="0">
               <a:buNone/>
-              <a:defRPr sz="3360" b="1"/>
+              <a:defRPr sz="2835" b="1"/>
             </a:lvl7pPr>
-            <a:lvl8pPr marL="6720200" indent="0">
+            <a:lvl8pPr marL="5669829" indent="0">
               <a:buNone/>
-              <a:defRPr sz="3360" b="1"/>
+              <a:defRPr sz="2835" b="1"/>
             </a:lvl8pPr>
-            <a:lvl9pPr marL="7680228" indent="0">
+            <a:lvl9pPr marL="6479804" indent="0">
               <a:buNone/>
-              <a:defRPr sz="3360" b="1"/>
+              <a:defRPr sz="2835" b="1"/>
             </a:lvl9pPr>
           </a:lstStyle>
           <a:p>
@@ -1777,8 +1777,8 @@
         </p:nvSpPr>
         <p:spPr>
           <a:xfrm>
-            <a:off x="2479672" y="5260078"/>
-            <a:ext cx="15229575" cy="7736782"/>
+            <a:off x="1487781" y="4602496"/>
+            <a:ext cx="9137611" cy="6769578"/>
           </a:xfrm>
         </p:spPr>
         <p:txBody>
@@ -1834,8 +1834,8 @@
         </p:nvSpPr>
         <p:spPr>
           <a:xfrm>
-            <a:off x="18224867" y="3530053"/>
-            <a:ext cx="15304578" cy="1730025"/>
+            <a:off x="10934760" y="3088748"/>
+            <a:ext cx="9182611" cy="1513748"/>
           </a:xfrm>
         </p:spPr>
         <p:txBody>
@@ -1843,39 +1843,39 @@
           <a:lstStyle>
             <a:lvl1pPr marL="0" indent="0">
               <a:buNone/>
-              <a:defRPr sz="5040" b="1"/>
+              <a:defRPr sz="4252" b="1"/>
             </a:lvl1pPr>
-            <a:lvl2pPr marL="960029" indent="0">
+            <a:lvl2pPr marL="809976" indent="0">
               <a:buNone/>
-              <a:defRPr sz="4200" b="1"/>
+              <a:defRPr sz="3543" b="1"/>
             </a:lvl2pPr>
-            <a:lvl3pPr marL="1920057" indent="0">
+            <a:lvl3pPr marL="1619951" indent="0">
               <a:buNone/>
-              <a:defRPr sz="3780" b="1"/>
+              <a:defRPr sz="3189" b="1"/>
             </a:lvl3pPr>
-            <a:lvl4pPr marL="2880086" indent="0">
+            <a:lvl4pPr marL="2429927" indent="0">
               <a:buNone/>
-              <a:defRPr sz="3360" b="1"/>
+              <a:defRPr sz="2835" b="1"/>
             </a:lvl4pPr>
-            <a:lvl5pPr marL="3840114" indent="0">
+            <a:lvl5pPr marL="3239902" indent="0">
               <a:buNone/>
-              <a:defRPr sz="3360" b="1"/>
+              <a:defRPr sz="2835" b="1"/>
             </a:lvl5pPr>
-            <a:lvl6pPr marL="4800143" indent="0">
+            <a:lvl6pPr marL="4049878" indent="0">
               <a:buNone/>
-              <a:defRPr sz="3360" b="1"/>
+              <a:defRPr sz="2835" b="1"/>
             </a:lvl6pPr>
-            <a:lvl7pPr marL="5760171" indent="0">
+            <a:lvl7pPr marL="4859853" indent="0">
               <a:buNone/>
-              <a:defRPr sz="3360" b="1"/>
+              <a:defRPr sz="2835" b="1"/>
             </a:lvl7pPr>
-            <a:lvl8pPr marL="6720200" indent="0">
+            <a:lvl8pPr marL="5669829" indent="0">
               <a:buNone/>
-              <a:defRPr sz="3360" b="1"/>
+              <a:defRPr sz="2835" b="1"/>
             </a:lvl8pPr>
-            <a:lvl9pPr marL="7680228" indent="0">
+            <a:lvl9pPr marL="6479804" indent="0">
               <a:buNone/>
-              <a:defRPr sz="3360" b="1"/>
+              <a:defRPr sz="2835" b="1"/>
             </a:lvl9pPr>
           </a:lstStyle>
           <a:p>
@@ -1899,8 +1899,8 @@
         </p:nvSpPr>
         <p:spPr>
           <a:xfrm>
-            <a:off x="18224867" y="5260078"/>
-            <a:ext cx="15304578" cy="7736782"/>
+            <a:off x="10934760" y="4602496"/>
+            <a:ext cx="9182611" cy="6769578"/>
           </a:xfrm>
         </p:spPr>
         <p:txBody>
@@ -1961,7 +1961,7 @@
           <a:p>
             <a:fld id="{EB01C8D4-EBBE-DF44-8BBA-54ECEA52E7BA}" type="datetimeFigureOut">
               <a:rPr lang="en-US" smtClean="0"/>
-              <a:t>7/13/23</a:t>
+              <a:t>7/18/23</a:t>
             </a:fld>
             <a:endParaRPr lang="en-US"/>
           </a:p>
@@ -2012,7 +2012,7 @@
     </p:spTree>
     <p:extLst>
       <p:ext uri="{BB962C8B-B14F-4D97-AF65-F5344CB8AC3E}">
-        <p14:creationId xmlns:p14="http://schemas.microsoft.com/office/powerpoint/2010/main" val="3628377466"/>
+        <p14:creationId xmlns:p14="http://schemas.microsoft.com/office/powerpoint/2010/main" val="277829579"/>
       </p:ext>
     </p:extLst>
   </p:cSld>
@@ -2079,7 +2079,7 @@
           <a:p>
             <a:fld id="{EB01C8D4-EBBE-DF44-8BBA-54ECEA52E7BA}" type="datetimeFigureOut">
               <a:rPr lang="en-US" smtClean="0"/>
-              <a:t>7/13/23</a:t>
+              <a:t>7/18/23</a:t>
             </a:fld>
             <a:endParaRPr lang="en-US"/>
           </a:p>
@@ -2130,7 +2130,7 @@
     </p:spTree>
     <p:extLst>
       <p:ext uri="{BB962C8B-B14F-4D97-AF65-F5344CB8AC3E}">
-        <p14:creationId xmlns:p14="http://schemas.microsoft.com/office/powerpoint/2010/main" val="3797581437"/>
+        <p14:creationId xmlns:p14="http://schemas.microsoft.com/office/powerpoint/2010/main" val="2191092723"/>
       </p:ext>
     </p:extLst>
   </p:cSld>
@@ -2174,7 +2174,7 @@
           <a:p>
             <a:fld id="{EB01C8D4-EBBE-DF44-8BBA-54ECEA52E7BA}" type="datetimeFigureOut">
               <a:rPr lang="en-US" smtClean="0"/>
-              <a:t>7/13/23</a:t>
+              <a:t>7/18/23</a:t>
             </a:fld>
             <a:endParaRPr lang="en-US"/>
           </a:p>
@@ -2225,7 +2225,7 @@
     </p:spTree>
     <p:extLst>
       <p:ext uri="{BB962C8B-B14F-4D97-AF65-F5344CB8AC3E}">
-        <p14:creationId xmlns:p14="http://schemas.microsoft.com/office/powerpoint/2010/main" val="569426706"/>
+        <p14:creationId xmlns:p14="http://schemas.microsoft.com/office/powerpoint/2010/main" val="211720953"/>
       </p:ext>
     </p:extLst>
   </p:cSld>
@@ -2264,15 +2264,15 @@
         </p:nvSpPr>
         <p:spPr>
           <a:xfrm>
-            <a:off x="2479672" y="960014"/>
-            <a:ext cx="11610852" cy="3360050"/>
+            <a:off x="1487782" y="839999"/>
+            <a:ext cx="6966408" cy="2939997"/>
           </a:xfrm>
         </p:spPr>
         <p:txBody>
           <a:bodyPr anchor="b"/>
           <a:lstStyle>
             <a:lvl1pPr>
-              <a:defRPr sz="6719"/>
+              <a:defRPr sz="5669"/>
             </a:lvl1pPr>
           </a:lstStyle>
           <a:p>
@@ -2296,39 +2296,39 @@
         </p:nvSpPr>
         <p:spPr>
           <a:xfrm>
-            <a:off x="15304578" y="2073365"/>
-            <a:ext cx="18224867" cy="10233485"/>
+            <a:off x="9182611" y="1814166"/>
+            <a:ext cx="10934760" cy="8954158"/>
           </a:xfrm>
         </p:spPr>
         <p:txBody>
           <a:bodyPr/>
           <a:lstStyle>
             <a:lvl1pPr>
-              <a:defRPr sz="6719"/>
+              <a:defRPr sz="5669"/>
             </a:lvl1pPr>
             <a:lvl2pPr>
-              <a:defRPr sz="5879"/>
+              <a:defRPr sz="4960"/>
             </a:lvl2pPr>
             <a:lvl3pPr>
-              <a:defRPr sz="5040"/>
+              <a:defRPr sz="4252"/>
             </a:lvl3pPr>
             <a:lvl4pPr>
-              <a:defRPr sz="4200"/>
+              <a:defRPr sz="3543"/>
             </a:lvl4pPr>
             <a:lvl5pPr>
-              <a:defRPr sz="4200"/>
+              <a:defRPr sz="3543"/>
             </a:lvl5pPr>
             <a:lvl6pPr>
-              <a:defRPr sz="4200"/>
+              <a:defRPr sz="3543"/>
             </a:lvl6pPr>
             <a:lvl7pPr>
-              <a:defRPr sz="4200"/>
+              <a:defRPr sz="3543"/>
             </a:lvl7pPr>
             <a:lvl8pPr>
-              <a:defRPr sz="4200"/>
+              <a:defRPr sz="3543"/>
             </a:lvl8pPr>
             <a:lvl9pPr>
-              <a:defRPr sz="4200"/>
+              <a:defRPr sz="3543"/>
             </a:lvl9pPr>
           </a:lstStyle>
           <a:p>
@@ -2381,8 +2381,8 @@
         </p:nvSpPr>
         <p:spPr>
           <a:xfrm>
-            <a:off x="2479672" y="4320064"/>
-            <a:ext cx="11610852" cy="8003453"/>
+            <a:off x="1487782" y="3779996"/>
+            <a:ext cx="6966408" cy="7002911"/>
           </a:xfrm>
         </p:spPr>
         <p:txBody>
@@ -2390,39 +2390,39 @@
           <a:lstStyle>
             <a:lvl1pPr marL="0" indent="0">
               <a:buNone/>
-              <a:defRPr sz="3360"/>
+              <a:defRPr sz="2835"/>
             </a:lvl1pPr>
-            <a:lvl2pPr marL="960029" indent="0">
+            <a:lvl2pPr marL="809976" indent="0">
               <a:buNone/>
-              <a:defRPr sz="2940"/>
+              <a:defRPr sz="2480"/>
             </a:lvl2pPr>
-            <a:lvl3pPr marL="1920057" indent="0">
+            <a:lvl3pPr marL="1619951" indent="0">
               <a:buNone/>
-              <a:defRPr sz="2520"/>
+              <a:defRPr sz="2126"/>
             </a:lvl3pPr>
-            <a:lvl4pPr marL="2880086" indent="0">
+            <a:lvl4pPr marL="2429927" indent="0">
               <a:buNone/>
-              <a:defRPr sz="2100"/>
+              <a:defRPr sz="1772"/>
             </a:lvl4pPr>
-            <a:lvl5pPr marL="3840114" indent="0">
+            <a:lvl5pPr marL="3239902" indent="0">
               <a:buNone/>
-              <a:defRPr sz="2100"/>
+              <a:defRPr sz="1772"/>
             </a:lvl5pPr>
-            <a:lvl6pPr marL="4800143" indent="0">
+            <a:lvl6pPr marL="4049878" indent="0">
               <a:buNone/>
-              <a:defRPr sz="2100"/>
+              <a:defRPr sz="1772"/>
             </a:lvl6pPr>
-            <a:lvl7pPr marL="5760171" indent="0">
+            <a:lvl7pPr marL="4859853" indent="0">
               <a:buNone/>
-              <a:defRPr sz="2100"/>
+              <a:defRPr sz="1772"/>
             </a:lvl7pPr>
-            <a:lvl8pPr marL="6720200" indent="0">
+            <a:lvl8pPr marL="5669829" indent="0">
               <a:buNone/>
-              <a:defRPr sz="2100"/>
+              <a:defRPr sz="1772"/>
             </a:lvl8pPr>
-            <a:lvl9pPr marL="7680228" indent="0">
+            <a:lvl9pPr marL="6479804" indent="0">
               <a:buNone/>
-              <a:defRPr sz="2100"/>
+              <a:defRPr sz="1772"/>
             </a:lvl9pPr>
           </a:lstStyle>
           <a:p>
@@ -2451,7 +2451,7 @@
           <a:p>
             <a:fld id="{EB01C8D4-EBBE-DF44-8BBA-54ECEA52E7BA}" type="datetimeFigureOut">
               <a:rPr lang="en-US" smtClean="0"/>
-              <a:t>7/13/23</a:t>
+              <a:t>7/18/23</a:t>
             </a:fld>
             <a:endParaRPr lang="en-US"/>
           </a:p>
@@ -2502,7 +2502,7 @@
     </p:spTree>
     <p:extLst>
       <p:ext uri="{BB962C8B-B14F-4D97-AF65-F5344CB8AC3E}">
-        <p14:creationId xmlns:p14="http://schemas.microsoft.com/office/powerpoint/2010/main" val="3552181555"/>
+        <p14:creationId xmlns:p14="http://schemas.microsoft.com/office/powerpoint/2010/main" val="711666449"/>
       </p:ext>
     </p:extLst>
   </p:cSld>
@@ -2541,15 +2541,15 @@
         </p:nvSpPr>
         <p:spPr>
           <a:xfrm>
-            <a:off x="2479672" y="960014"/>
-            <a:ext cx="11610852" cy="3360050"/>
+            <a:off x="1487782" y="839999"/>
+            <a:ext cx="6966408" cy="2939997"/>
           </a:xfrm>
         </p:spPr>
         <p:txBody>
           <a:bodyPr anchor="b"/>
           <a:lstStyle>
             <a:lvl1pPr>
-              <a:defRPr sz="6719"/>
+              <a:defRPr sz="5669"/>
             </a:lvl1pPr>
           </a:lstStyle>
           <a:p>
@@ -2573,8 +2573,8 @@
         </p:nvSpPr>
         <p:spPr>
           <a:xfrm>
-            <a:off x="15304578" y="2073365"/>
-            <a:ext cx="18224867" cy="10233485"/>
+            <a:off x="9182611" y="1814166"/>
+            <a:ext cx="10934760" cy="8954158"/>
           </a:xfrm>
         </p:spPr>
         <p:txBody>
@@ -2582,39 +2582,39 @@
           <a:lstStyle>
             <a:lvl1pPr marL="0" indent="0">
               <a:buNone/>
-              <a:defRPr sz="6719"/>
+              <a:defRPr sz="5669"/>
             </a:lvl1pPr>
-            <a:lvl2pPr marL="960029" indent="0">
+            <a:lvl2pPr marL="809976" indent="0">
               <a:buNone/>
-              <a:defRPr sz="5879"/>
+              <a:defRPr sz="4960"/>
             </a:lvl2pPr>
-            <a:lvl3pPr marL="1920057" indent="0">
+            <a:lvl3pPr marL="1619951" indent="0">
               <a:buNone/>
-              <a:defRPr sz="5040"/>
+              <a:defRPr sz="4252"/>
             </a:lvl3pPr>
-            <a:lvl4pPr marL="2880086" indent="0">
+            <a:lvl4pPr marL="2429927" indent="0">
               <a:buNone/>
-              <a:defRPr sz="4200"/>
+              <a:defRPr sz="3543"/>
             </a:lvl4pPr>
-            <a:lvl5pPr marL="3840114" indent="0">
+            <a:lvl5pPr marL="3239902" indent="0">
               <a:buNone/>
-              <a:defRPr sz="4200"/>
+              <a:defRPr sz="3543"/>
             </a:lvl5pPr>
-            <a:lvl6pPr marL="4800143" indent="0">
+            <a:lvl6pPr marL="4049878" indent="0">
               <a:buNone/>
-              <a:defRPr sz="4200"/>
+              <a:defRPr sz="3543"/>
             </a:lvl6pPr>
-            <a:lvl7pPr marL="5760171" indent="0">
+            <a:lvl7pPr marL="4859853" indent="0">
               <a:buNone/>
-              <a:defRPr sz="4200"/>
+              <a:defRPr sz="3543"/>
             </a:lvl7pPr>
-            <a:lvl8pPr marL="6720200" indent="0">
+            <a:lvl8pPr marL="5669829" indent="0">
               <a:buNone/>
-              <a:defRPr sz="4200"/>
+              <a:defRPr sz="3543"/>
             </a:lvl8pPr>
-            <a:lvl9pPr marL="7680228" indent="0">
+            <a:lvl9pPr marL="6479804" indent="0">
               <a:buNone/>
-              <a:defRPr sz="4200"/>
+              <a:defRPr sz="3543"/>
             </a:lvl9pPr>
           </a:lstStyle>
           <a:p>
@@ -2638,8 +2638,8 @@
         </p:nvSpPr>
         <p:spPr>
           <a:xfrm>
-            <a:off x="2479672" y="4320064"/>
-            <a:ext cx="11610852" cy="8003453"/>
+            <a:off x="1487782" y="3779996"/>
+            <a:ext cx="6966408" cy="7002911"/>
           </a:xfrm>
         </p:spPr>
         <p:txBody>
@@ -2647,39 +2647,39 @@
           <a:lstStyle>
             <a:lvl1pPr marL="0" indent="0">
               <a:buNone/>
-              <a:defRPr sz="3360"/>
+              <a:defRPr sz="2835"/>
             </a:lvl1pPr>
-            <a:lvl2pPr marL="960029" indent="0">
+            <a:lvl2pPr marL="809976" indent="0">
               <a:buNone/>
-              <a:defRPr sz="2940"/>
+              <a:defRPr sz="2480"/>
             </a:lvl2pPr>
-            <a:lvl3pPr marL="1920057" indent="0">
+            <a:lvl3pPr marL="1619951" indent="0">
               <a:buNone/>
-              <a:defRPr sz="2520"/>
+              <a:defRPr sz="2126"/>
             </a:lvl3pPr>
-            <a:lvl4pPr marL="2880086" indent="0">
+            <a:lvl4pPr marL="2429927" indent="0">
               <a:buNone/>
-              <a:defRPr sz="2100"/>
+              <a:defRPr sz="1772"/>
             </a:lvl4pPr>
-            <a:lvl5pPr marL="3840114" indent="0">
+            <a:lvl5pPr marL="3239902" indent="0">
               <a:buNone/>
-              <a:defRPr sz="2100"/>
+              <a:defRPr sz="1772"/>
             </a:lvl5pPr>
-            <a:lvl6pPr marL="4800143" indent="0">
+            <a:lvl6pPr marL="4049878" indent="0">
               <a:buNone/>
-              <a:defRPr sz="2100"/>
+              <a:defRPr sz="1772"/>
             </a:lvl6pPr>
-            <a:lvl7pPr marL="5760171" indent="0">
+            <a:lvl7pPr marL="4859853" indent="0">
               <a:buNone/>
-              <a:defRPr sz="2100"/>
+              <a:defRPr sz="1772"/>
             </a:lvl7pPr>
-            <a:lvl8pPr marL="6720200" indent="0">
+            <a:lvl8pPr marL="5669829" indent="0">
               <a:buNone/>
-              <a:defRPr sz="2100"/>
+              <a:defRPr sz="1772"/>
             </a:lvl8pPr>
-            <a:lvl9pPr marL="7680228" indent="0">
+            <a:lvl9pPr marL="6479804" indent="0">
               <a:buNone/>
-              <a:defRPr sz="2100"/>
+              <a:defRPr sz="1772"/>
             </a:lvl9pPr>
           </a:lstStyle>
           <a:p>
@@ -2708,7 +2708,7 @@
           <a:p>
             <a:fld id="{EB01C8D4-EBBE-DF44-8BBA-54ECEA52E7BA}" type="datetimeFigureOut">
               <a:rPr lang="en-US" smtClean="0"/>
-              <a:t>7/13/23</a:t>
+              <a:t>7/18/23</a:t>
             </a:fld>
             <a:endParaRPr lang="en-US"/>
           </a:p>
@@ -2759,7 +2759,7 @@
     </p:spTree>
     <p:extLst>
       <p:ext uri="{BB962C8B-B14F-4D97-AF65-F5344CB8AC3E}">
-        <p14:creationId xmlns:p14="http://schemas.microsoft.com/office/powerpoint/2010/main" val="2951340775"/>
+        <p14:creationId xmlns:p14="http://schemas.microsoft.com/office/powerpoint/2010/main" val="1508627587"/>
       </p:ext>
     </p:extLst>
   </p:cSld>
@@ -2803,8 +2803,8 @@
         </p:nvSpPr>
         <p:spPr>
           <a:xfrm>
-            <a:off x="2474982" y="766679"/>
-            <a:ext cx="31049774" cy="2783376"/>
+            <a:off x="1484968" y="670834"/>
+            <a:ext cx="18629590" cy="2435415"/>
           </a:xfrm>
           <a:prstGeom prst="rect">
             <a:avLst/>
@@ -2836,8 +2836,8 @@
         </p:nvSpPr>
         <p:spPr>
           <a:xfrm>
-            <a:off x="2474982" y="3833390"/>
-            <a:ext cx="31049774" cy="9136803"/>
+            <a:off x="1484968" y="3354163"/>
+            <a:ext cx="18629590" cy="7994577"/>
           </a:xfrm>
           <a:prstGeom prst="rect">
             <a:avLst/>
@@ -2898,8 +2898,8 @@
         </p:nvSpPr>
         <p:spPr>
           <a:xfrm>
-            <a:off x="2474982" y="13346865"/>
-            <a:ext cx="8099941" cy="766678"/>
+            <a:off x="1484967" y="11678323"/>
+            <a:ext cx="4859893" cy="670833"/>
           </a:xfrm>
           <a:prstGeom prst="rect">
             <a:avLst/>
@@ -2909,7 +2909,7 @@
           <a:bodyPr vert="horz" lIns="91440" tIns="45720" rIns="91440" bIns="45720" rtlCol="0" anchor="ctr"/>
           <a:lstStyle>
             <a:lvl1pPr algn="l">
-              <a:defRPr sz="2520">
+              <a:defRPr sz="2126">
                 <a:solidFill>
                   <a:schemeClr val="tx1">
                     <a:tint val="75000"/>
@@ -2921,7 +2921,7 @@
           <a:p>
             <a:fld id="{EB01C8D4-EBBE-DF44-8BBA-54ECEA52E7BA}" type="datetimeFigureOut">
               <a:rPr lang="en-US" smtClean="0"/>
-              <a:t>7/13/23</a:t>
+              <a:t>7/18/23</a:t>
             </a:fld>
             <a:endParaRPr lang="en-US"/>
           </a:p>
@@ -2939,8 +2939,8 @@
         </p:nvSpPr>
         <p:spPr>
           <a:xfrm>
-            <a:off x="11924913" y="13346865"/>
-            <a:ext cx="12149912" cy="766678"/>
+            <a:off x="7154843" y="11678323"/>
+            <a:ext cx="7289840" cy="670833"/>
           </a:xfrm>
           <a:prstGeom prst="rect">
             <a:avLst/>
@@ -2950,7 +2950,7 @@
           <a:bodyPr vert="horz" lIns="91440" tIns="45720" rIns="91440" bIns="45720" rtlCol="0" anchor="ctr"/>
           <a:lstStyle>
             <a:lvl1pPr algn="ctr">
-              <a:defRPr sz="2520">
+              <a:defRPr sz="2126">
                 <a:solidFill>
                   <a:schemeClr val="tx1">
                     <a:tint val="75000"/>
@@ -2976,8 +2976,8 @@
         </p:nvSpPr>
         <p:spPr>
           <a:xfrm>
-            <a:off x="25424815" y="13346865"/>
-            <a:ext cx="8099941" cy="766678"/>
+            <a:off x="15254665" y="11678323"/>
+            <a:ext cx="4859893" cy="670833"/>
           </a:xfrm>
           <a:prstGeom prst="rect">
             <a:avLst/>
@@ -2987,7 +2987,7 @@
           <a:bodyPr vert="horz" lIns="91440" tIns="45720" rIns="91440" bIns="45720" rtlCol="0" anchor="ctr"/>
           <a:lstStyle>
             <a:lvl1pPr algn="r">
-              <a:defRPr sz="2520">
+              <a:defRPr sz="2126">
                 <a:solidFill>
                   <a:schemeClr val="tx1">
                     <a:tint val="75000"/>
@@ -3008,27 +3008,27 @@
     </p:spTree>
     <p:extLst>
       <p:ext uri="{BB962C8B-B14F-4D97-AF65-F5344CB8AC3E}">
-        <p14:creationId xmlns:p14="http://schemas.microsoft.com/office/powerpoint/2010/main" val="3130847365"/>
+        <p14:creationId xmlns:p14="http://schemas.microsoft.com/office/powerpoint/2010/main" val="1385078450"/>
       </p:ext>
     </p:extLst>
   </p:cSld>
   <p:clrMap bg1="lt1" tx1="dk1" bg2="lt2" tx2="dk2" accent1="accent1" accent2="accent2" accent3="accent3" accent4="accent4" accent5="accent5" accent6="accent6" hlink="hlink" folHlink="folHlink"/>
   <p:sldLayoutIdLst>
-    <p:sldLayoutId id="2147483685" r:id="rId1"/>
-    <p:sldLayoutId id="2147483686" r:id="rId2"/>
-    <p:sldLayoutId id="2147483687" r:id="rId3"/>
-    <p:sldLayoutId id="2147483688" r:id="rId4"/>
-    <p:sldLayoutId id="2147483689" r:id="rId5"/>
-    <p:sldLayoutId id="2147483690" r:id="rId6"/>
-    <p:sldLayoutId id="2147483691" r:id="rId7"/>
-    <p:sldLayoutId id="2147483692" r:id="rId8"/>
-    <p:sldLayoutId id="2147483693" r:id="rId9"/>
-    <p:sldLayoutId id="2147483694" r:id="rId10"/>
-    <p:sldLayoutId id="2147483695" r:id="rId11"/>
+    <p:sldLayoutId id="2147483757" r:id="rId1"/>
+    <p:sldLayoutId id="2147483758" r:id="rId2"/>
+    <p:sldLayoutId id="2147483759" r:id="rId3"/>
+    <p:sldLayoutId id="2147483760" r:id="rId4"/>
+    <p:sldLayoutId id="2147483761" r:id="rId5"/>
+    <p:sldLayoutId id="2147483762" r:id="rId6"/>
+    <p:sldLayoutId id="2147483763" r:id="rId7"/>
+    <p:sldLayoutId id="2147483764" r:id="rId8"/>
+    <p:sldLayoutId id="2147483765" r:id="rId9"/>
+    <p:sldLayoutId id="2147483766" r:id="rId10"/>
+    <p:sldLayoutId id="2147483767" r:id="rId11"/>
   </p:sldLayoutIdLst>
   <p:txStyles>
     <p:titleStyle>
-      <a:lvl1pPr algn="l" defTabSz="1920057" rtl="0" eaLnBrk="1" latinLnBrk="0" hangingPunct="1">
+      <a:lvl1pPr algn="l" defTabSz="1619951" rtl="0" eaLnBrk="1" latinLnBrk="0" hangingPunct="1">
         <a:lnSpc>
           <a:spcPct val="90000"/>
         </a:lnSpc>
@@ -3036,7 +3036,7 @@
           <a:spcPct val="0"/>
         </a:spcBef>
         <a:buNone/>
-        <a:defRPr sz="9239" kern="1200">
+        <a:defRPr sz="7795" kern="1200">
           <a:solidFill>
             <a:schemeClr val="tx1"/>
           </a:solidFill>
@@ -3047,16 +3047,16 @@
       </a:lvl1pPr>
     </p:titleStyle>
     <p:bodyStyle>
-      <a:lvl1pPr marL="480014" indent="-480014" algn="l" defTabSz="1920057" rtl="0" eaLnBrk="1" latinLnBrk="0" hangingPunct="1">
+      <a:lvl1pPr marL="404988" indent="-404988" algn="l" defTabSz="1619951" rtl="0" eaLnBrk="1" latinLnBrk="0" hangingPunct="1">
         <a:lnSpc>
           <a:spcPct val="90000"/>
         </a:lnSpc>
         <a:spcBef>
-          <a:spcPts val="2100"/>
+          <a:spcPts val="1772"/>
         </a:spcBef>
         <a:buFont typeface="Arial" panose="020B0604020202020204" pitchFamily="34" charset="0"/>
         <a:buChar char="•"/>
-        <a:defRPr sz="5879" kern="1200">
+        <a:defRPr sz="4960" kern="1200">
           <a:solidFill>
             <a:schemeClr val="tx1"/>
           </a:solidFill>
@@ -3065,16 +3065,16 @@
           <a:cs typeface="+mn-cs"/>
         </a:defRPr>
       </a:lvl1pPr>
-      <a:lvl2pPr marL="1440043" indent="-480014" algn="l" defTabSz="1920057" rtl="0" eaLnBrk="1" latinLnBrk="0" hangingPunct="1">
+      <a:lvl2pPr marL="1214963" indent="-404988" algn="l" defTabSz="1619951" rtl="0" eaLnBrk="1" latinLnBrk="0" hangingPunct="1">
         <a:lnSpc>
           <a:spcPct val="90000"/>
         </a:lnSpc>
         <a:spcBef>
-          <a:spcPts val="1050"/>
+          <a:spcPts val="886"/>
         </a:spcBef>
         <a:buFont typeface="Arial" panose="020B0604020202020204" pitchFamily="34" charset="0"/>
         <a:buChar char="•"/>
-        <a:defRPr sz="5040" kern="1200">
+        <a:defRPr sz="4252" kern="1200">
           <a:solidFill>
             <a:schemeClr val="tx1"/>
           </a:solidFill>
@@ -3083,16 +3083,16 @@
           <a:cs typeface="+mn-cs"/>
         </a:defRPr>
       </a:lvl2pPr>
-      <a:lvl3pPr marL="2400071" indent="-480014" algn="l" defTabSz="1920057" rtl="0" eaLnBrk="1" latinLnBrk="0" hangingPunct="1">
+      <a:lvl3pPr marL="2024939" indent="-404988" algn="l" defTabSz="1619951" rtl="0" eaLnBrk="1" latinLnBrk="0" hangingPunct="1">
         <a:lnSpc>
           <a:spcPct val="90000"/>
         </a:lnSpc>
         <a:spcBef>
-          <a:spcPts val="1050"/>
+          <a:spcPts val="886"/>
         </a:spcBef>
         <a:buFont typeface="Arial" panose="020B0604020202020204" pitchFamily="34" charset="0"/>
         <a:buChar char="•"/>
-        <a:defRPr sz="4200" kern="1200">
+        <a:defRPr sz="3543" kern="1200">
           <a:solidFill>
             <a:schemeClr val="tx1"/>
           </a:solidFill>
@@ -3101,16 +3101,16 @@
           <a:cs typeface="+mn-cs"/>
         </a:defRPr>
       </a:lvl3pPr>
-      <a:lvl4pPr marL="3360100" indent="-480014" algn="l" defTabSz="1920057" rtl="0" eaLnBrk="1" latinLnBrk="0" hangingPunct="1">
+      <a:lvl4pPr marL="2834914" indent="-404988" algn="l" defTabSz="1619951" rtl="0" eaLnBrk="1" latinLnBrk="0" hangingPunct="1">
         <a:lnSpc>
           <a:spcPct val="90000"/>
         </a:lnSpc>
         <a:spcBef>
-          <a:spcPts val="1050"/>
+          <a:spcPts val="886"/>
         </a:spcBef>
         <a:buFont typeface="Arial" panose="020B0604020202020204" pitchFamily="34" charset="0"/>
         <a:buChar char="•"/>
-        <a:defRPr sz="3780" kern="1200">
+        <a:defRPr sz="3189" kern="1200">
           <a:solidFill>
             <a:schemeClr val="tx1"/>
           </a:solidFill>
@@ -3119,16 +3119,16 @@
           <a:cs typeface="+mn-cs"/>
         </a:defRPr>
       </a:lvl4pPr>
-      <a:lvl5pPr marL="4320129" indent="-480014" algn="l" defTabSz="1920057" rtl="0" eaLnBrk="1" latinLnBrk="0" hangingPunct="1">
+      <a:lvl5pPr marL="3644890" indent="-404988" algn="l" defTabSz="1619951" rtl="0" eaLnBrk="1" latinLnBrk="0" hangingPunct="1">
         <a:lnSpc>
           <a:spcPct val="90000"/>
         </a:lnSpc>
         <a:spcBef>
-          <a:spcPts val="1050"/>
+          <a:spcPts val="886"/>
         </a:spcBef>
         <a:buFont typeface="Arial" panose="020B0604020202020204" pitchFamily="34" charset="0"/>
         <a:buChar char="•"/>
-        <a:defRPr sz="3780" kern="1200">
+        <a:defRPr sz="3189" kern="1200">
           <a:solidFill>
             <a:schemeClr val="tx1"/>
           </a:solidFill>
@@ -3137,16 +3137,16 @@
           <a:cs typeface="+mn-cs"/>
         </a:defRPr>
       </a:lvl5pPr>
-      <a:lvl6pPr marL="5280157" indent="-480014" algn="l" defTabSz="1920057" rtl="0" eaLnBrk="1" latinLnBrk="0" hangingPunct="1">
+      <a:lvl6pPr marL="4454865" indent="-404988" algn="l" defTabSz="1619951" rtl="0" eaLnBrk="1" latinLnBrk="0" hangingPunct="1">
         <a:lnSpc>
           <a:spcPct val="90000"/>
         </a:lnSpc>
         <a:spcBef>
-          <a:spcPts val="1050"/>
+          <a:spcPts val="886"/>
         </a:spcBef>
         <a:buFont typeface="Arial" panose="020B0604020202020204" pitchFamily="34" charset="0"/>
         <a:buChar char="•"/>
-        <a:defRPr sz="3780" kern="1200">
+        <a:defRPr sz="3189" kern="1200">
           <a:solidFill>
             <a:schemeClr val="tx1"/>
           </a:solidFill>
@@ -3155,16 +3155,16 @@
           <a:cs typeface="+mn-cs"/>
         </a:defRPr>
       </a:lvl6pPr>
-      <a:lvl7pPr marL="6240186" indent="-480014" algn="l" defTabSz="1920057" rtl="0" eaLnBrk="1" latinLnBrk="0" hangingPunct="1">
+      <a:lvl7pPr marL="5264841" indent="-404988" algn="l" defTabSz="1619951" rtl="0" eaLnBrk="1" latinLnBrk="0" hangingPunct="1">
         <a:lnSpc>
           <a:spcPct val="90000"/>
         </a:lnSpc>
         <a:spcBef>
-          <a:spcPts val="1050"/>
+          <a:spcPts val="886"/>
         </a:spcBef>
         <a:buFont typeface="Arial" panose="020B0604020202020204" pitchFamily="34" charset="0"/>
         <a:buChar char="•"/>
-        <a:defRPr sz="3780" kern="1200">
+        <a:defRPr sz="3189" kern="1200">
           <a:solidFill>
             <a:schemeClr val="tx1"/>
           </a:solidFill>
@@ -3173,16 +3173,16 @@
           <a:cs typeface="+mn-cs"/>
         </a:defRPr>
       </a:lvl7pPr>
-      <a:lvl8pPr marL="7200214" indent="-480014" algn="l" defTabSz="1920057" rtl="0" eaLnBrk="1" latinLnBrk="0" hangingPunct="1">
+      <a:lvl8pPr marL="6074816" indent="-404988" algn="l" defTabSz="1619951" rtl="0" eaLnBrk="1" latinLnBrk="0" hangingPunct="1">
         <a:lnSpc>
           <a:spcPct val="90000"/>
         </a:lnSpc>
         <a:spcBef>
-          <a:spcPts val="1050"/>
+          <a:spcPts val="886"/>
         </a:spcBef>
         <a:buFont typeface="Arial" panose="020B0604020202020204" pitchFamily="34" charset="0"/>
         <a:buChar char="•"/>
-        <a:defRPr sz="3780" kern="1200">
+        <a:defRPr sz="3189" kern="1200">
           <a:solidFill>
             <a:schemeClr val="tx1"/>
           </a:solidFill>
@@ -3191,16 +3191,16 @@
           <a:cs typeface="+mn-cs"/>
         </a:defRPr>
       </a:lvl8pPr>
-      <a:lvl9pPr marL="8160243" indent="-480014" algn="l" defTabSz="1920057" rtl="0" eaLnBrk="1" latinLnBrk="0" hangingPunct="1">
+      <a:lvl9pPr marL="6884792" indent="-404988" algn="l" defTabSz="1619951" rtl="0" eaLnBrk="1" latinLnBrk="0" hangingPunct="1">
         <a:lnSpc>
           <a:spcPct val="90000"/>
         </a:lnSpc>
         <a:spcBef>
-          <a:spcPts val="1050"/>
+          <a:spcPts val="886"/>
         </a:spcBef>
         <a:buFont typeface="Arial" panose="020B0604020202020204" pitchFamily="34" charset="0"/>
         <a:buChar char="•"/>
-        <a:defRPr sz="3780" kern="1200">
+        <a:defRPr sz="3189" kern="1200">
           <a:solidFill>
             <a:schemeClr val="tx1"/>
           </a:solidFill>
@@ -3214,8 +3214,8 @@
       <a:defPPr>
         <a:defRPr lang="en-US"/>
       </a:defPPr>
-      <a:lvl1pPr marL="0" algn="l" defTabSz="1920057" rtl="0" eaLnBrk="1" latinLnBrk="0" hangingPunct="1">
-        <a:defRPr sz="3780" kern="1200">
+      <a:lvl1pPr marL="0" algn="l" defTabSz="1619951" rtl="0" eaLnBrk="1" latinLnBrk="0" hangingPunct="1">
+        <a:defRPr sz="3189" kern="1200">
           <a:solidFill>
             <a:schemeClr val="tx1"/>
           </a:solidFill>
@@ -3224,8 +3224,8 @@
           <a:cs typeface="+mn-cs"/>
         </a:defRPr>
       </a:lvl1pPr>
-      <a:lvl2pPr marL="960029" algn="l" defTabSz="1920057" rtl="0" eaLnBrk="1" latinLnBrk="0" hangingPunct="1">
-        <a:defRPr sz="3780" kern="1200">
+      <a:lvl2pPr marL="809976" algn="l" defTabSz="1619951" rtl="0" eaLnBrk="1" latinLnBrk="0" hangingPunct="1">
+        <a:defRPr sz="3189" kern="1200">
           <a:solidFill>
             <a:schemeClr val="tx1"/>
           </a:solidFill>
@@ -3234,8 +3234,8 @@
           <a:cs typeface="+mn-cs"/>
         </a:defRPr>
       </a:lvl2pPr>
-      <a:lvl3pPr marL="1920057" algn="l" defTabSz="1920057" rtl="0" eaLnBrk="1" latinLnBrk="0" hangingPunct="1">
-        <a:defRPr sz="3780" kern="1200">
+      <a:lvl3pPr marL="1619951" algn="l" defTabSz="1619951" rtl="0" eaLnBrk="1" latinLnBrk="0" hangingPunct="1">
+        <a:defRPr sz="3189" kern="1200">
           <a:solidFill>
             <a:schemeClr val="tx1"/>
           </a:solidFill>
@@ -3244,8 +3244,8 @@
           <a:cs typeface="+mn-cs"/>
         </a:defRPr>
       </a:lvl3pPr>
-      <a:lvl4pPr marL="2880086" algn="l" defTabSz="1920057" rtl="0" eaLnBrk="1" latinLnBrk="0" hangingPunct="1">
-        <a:defRPr sz="3780" kern="1200">
+      <a:lvl4pPr marL="2429927" algn="l" defTabSz="1619951" rtl="0" eaLnBrk="1" latinLnBrk="0" hangingPunct="1">
+        <a:defRPr sz="3189" kern="1200">
           <a:solidFill>
             <a:schemeClr val="tx1"/>
           </a:solidFill>
@@ -3254,8 +3254,8 @@
           <a:cs typeface="+mn-cs"/>
         </a:defRPr>
       </a:lvl4pPr>
-      <a:lvl5pPr marL="3840114" algn="l" defTabSz="1920057" rtl="0" eaLnBrk="1" latinLnBrk="0" hangingPunct="1">
-        <a:defRPr sz="3780" kern="1200">
+      <a:lvl5pPr marL="3239902" algn="l" defTabSz="1619951" rtl="0" eaLnBrk="1" latinLnBrk="0" hangingPunct="1">
+        <a:defRPr sz="3189" kern="1200">
           <a:solidFill>
             <a:schemeClr val="tx1"/>
           </a:solidFill>
@@ -3264,8 +3264,8 @@
           <a:cs typeface="+mn-cs"/>
         </a:defRPr>
       </a:lvl5pPr>
-      <a:lvl6pPr marL="4800143" algn="l" defTabSz="1920057" rtl="0" eaLnBrk="1" latinLnBrk="0" hangingPunct="1">
-        <a:defRPr sz="3780" kern="1200">
+      <a:lvl6pPr marL="4049878" algn="l" defTabSz="1619951" rtl="0" eaLnBrk="1" latinLnBrk="0" hangingPunct="1">
+        <a:defRPr sz="3189" kern="1200">
           <a:solidFill>
             <a:schemeClr val="tx1"/>
           </a:solidFill>
@@ -3274,8 +3274,8 @@
           <a:cs typeface="+mn-cs"/>
         </a:defRPr>
       </a:lvl6pPr>
-      <a:lvl7pPr marL="5760171" algn="l" defTabSz="1920057" rtl="0" eaLnBrk="1" latinLnBrk="0" hangingPunct="1">
-        <a:defRPr sz="3780" kern="1200">
+      <a:lvl7pPr marL="4859853" algn="l" defTabSz="1619951" rtl="0" eaLnBrk="1" latinLnBrk="0" hangingPunct="1">
+        <a:defRPr sz="3189" kern="1200">
           <a:solidFill>
             <a:schemeClr val="tx1"/>
           </a:solidFill>
@@ -3284,8 +3284,8 @@
           <a:cs typeface="+mn-cs"/>
         </a:defRPr>
       </a:lvl7pPr>
-      <a:lvl8pPr marL="6720200" algn="l" defTabSz="1920057" rtl="0" eaLnBrk="1" latinLnBrk="0" hangingPunct="1">
-        <a:defRPr sz="3780" kern="1200">
+      <a:lvl8pPr marL="5669829" algn="l" defTabSz="1619951" rtl="0" eaLnBrk="1" latinLnBrk="0" hangingPunct="1">
+        <a:defRPr sz="3189" kern="1200">
           <a:solidFill>
             <a:schemeClr val="tx1"/>
           </a:solidFill>
@@ -3294,8 +3294,8 @@
           <a:cs typeface="+mn-cs"/>
         </a:defRPr>
       </a:lvl8pPr>
-      <a:lvl9pPr marL="7680228" algn="l" defTabSz="1920057" rtl="0" eaLnBrk="1" latinLnBrk="0" hangingPunct="1">
-        <a:defRPr sz="3780" kern="1200">
+      <a:lvl9pPr marL="6479804" algn="l" defTabSz="1619951" rtl="0" eaLnBrk="1" latinLnBrk="0" hangingPunct="1">
+        <a:defRPr sz="3189" kern="1200">
           <a:solidFill>
             <a:schemeClr val="tx1"/>
           </a:solidFill>
@@ -3348,7 +3348,7 @@
         </p:blipFill>
         <p:spPr>
           <a:xfrm>
-            <a:off x="18276520" y="8084269"/>
+            <a:off x="14069186" y="6703167"/>
             <a:ext cx="8149639" cy="6112229"/>
           </a:xfrm>
           <a:prstGeom prst="rect">
@@ -3378,7 +3378,7 @@
         </p:blipFill>
         <p:spPr>
           <a:xfrm>
-            <a:off x="18322384" y="1769437"/>
+            <a:off x="14115050" y="388334"/>
             <a:ext cx="8149639" cy="6112229"/>
           </a:xfrm>
           <a:prstGeom prst="rect">
@@ -3400,7 +3400,7 @@
         </p:nvSpPr>
         <p:spPr>
           <a:xfrm>
-            <a:off x="4607211" y="2586103"/>
+            <a:off x="399871" y="1205001"/>
             <a:ext cx="12759710" cy="3219181"/>
           </a:xfrm>
           <a:prstGeom prst="rect">
@@ -3460,7 +3460,7 @@
         </p:nvSpPr>
         <p:spPr>
           <a:xfrm>
-            <a:off x="4607212" y="6477220"/>
+            <a:off x="399872" y="5096118"/>
             <a:ext cx="12759710" cy="3219181"/>
           </a:xfrm>
           <a:prstGeom prst="rect">
@@ -3520,7 +3520,7 @@
         </p:nvSpPr>
         <p:spPr>
           <a:xfrm>
-            <a:off x="4607212" y="10385693"/>
+            <a:off x="399872" y="9004591"/>
             <a:ext cx="12759710" cy="3219181"/>
           </a:xfrm>
           <a:prstGeom prst="rect">
@@ -3580,7 +3580,7 @@
         </p:nvSpPr>
         <p:spPr>
           <a:xfrm>
-            <a:off x="7021105" y="8221022"/>
+            <a:off x="2813771" y="6839914"/>
             <a:ext cx="10082791" cy="480400"/>
           </a:xfrm>
           <a:prstGeom prst="rect">
@@ -3626,7 +3626,7 @@
         </p:nvSpPr>
         <p:spPr>
           <a:xfrm>
-            <a:off x="8895554" y="1590594"/>
+            <a:off x="4688214" y="209491"/>
             <a:ext cx="1782860" cy="830997"/>
           </a:xfrm>
           <a:prstGeom prst="rect">
@@ -3665,7 +3665,7 @@
         </p:nvSpPr>
         <p:spPr>
           <a:xfrm>
-            <a:off x="12791095" y="1590593"/>
+            <a:off x="8583755" y="209490"/>
             <a:ext cx="2468496" cy="830997"/>
           </a:xfrm>
           <a:prstGeom prst="rect">
@@ -3706,7 +3706,7 @@
         </p:nvSpPr>
         <p:spPr>
           <a:xfrm>
-            <a:off x="9308933" y="4316989"/>
+            <a:off x="5101599" y="2935881"/>
             <a:ext cx="1218677" cy="480400"/>
           </a:xfrm>
           <a:prstGeom prst="rect">
@@ -3752,7 +3752,7 @@
         </p:nvSpPr>
         <p:spPr>
           <a:xfrm>
-            <a:off x="13551711" y="4316989"/>
+            <a:off x="9344377" y="2935881"/>
             <a:ext cx="1218677" cy="480400"/>
           </a:xfrm>
           <a:prstGeom prst="rect">
@@ -3798,7 +3798,7 @@
         </p:nvSpPr>
         <p:spPr>
           <a:xfrm rot="5400000">
-            <a:off x="15789583" y="6859597"/>
+            <a:off x="11582243" y="5478495"/>
             <a:ext cx="327196" cy="2284575"/>
           </a:xfrm>
           <a:prstGeom prst="leftBrace">
@@ -3843,7 +3843,7 @@
         </p:nvSpPr>
         <p:spPr>
           <a:xfrm>
-            <a:off x="15497537" y="7353590"/>
+            <a:off x="11290203" y="5972488"/>
             <a:ext cx="806631" cy="461665"/>
           </a:xfrm>
           <a:prstGeom prst="rect">
@@ -3879,7 +3879,7 @@
         </p:nvSpPr>
         <p:spPr>
           <a:xfrm rot="5400000">
-            <a:off x="11901973" y="5988198"/>
+            <a:off x="7694633" y="4607096"/>
             <a:ext cx="327196" cy="4027371"/>
           </a:xfrm>
           <a:prstGeom prst="leftBrace">
@@ -3924,7 +3924,7 @@
         </p:nvSpPr>
         <p:spPr>
           <a:xfrm>
-            <a:off x="9231109" y="3507087"/>
+            <a:off x="5023769" y="2125985"/>
             <a:ext cx="651140" cy="461665"/>
           </a:xfrm>
           <a:prstGeom prst="rect">
@@ -3959,7 +3959,7 @@
         </p:nvSpPr>
         <p:spPr>
           <a:xfrm>
-            <a:off x="10791645" y="7347239"/>
+            <a:off x="6584305" y="5966131"/>
             <a:ext cx="2544158" cy="523220"/>
           </a:xfrm>
           <a:prstGeom prst="rect">
@@ -3994,7 +3994,7 @@
         </p:nvSpPr>
         <p:spPr>
           <a:xfrm>
-            <a:off x="7021105" y="12144118"/>
+            <a:off x="2813765" y="10763010"/>
             <a:ext cx="10096084" cy="480400"/>
           </a:xfrm>
           <a:prstGeom prst="rect">
@@ -4040,7 +4040,7 @@
         </p:nvSpPr>
         <p:spPr>
           <a:xfrm>
-            <a:off x="7014233" y="12144118"/>
+            <a:off x="2806899" y="10763010"/>
             <a:ext cx="2293001" cy="480400"/>
           </a:xfrm>
           <a:prstGeom prst="rect">
@@ -4099,7 +4099,7 @@
         </p:nvSpPr>
         <p:spPr>
           <a:xfrm>
-            <a:off x="14810895" y="12144118"/>
+            <a:off x="10603561" y="10763010"/>
             <a:ext cx="2293001" cy="480400"/>
           </a:xfrm>
           <a:prstGeom prst="rect">
@@ -4158,7 +4158,7 @@
         </p:nvSpPr>
         <p:spPr>
           <a:xfrm>
-            <a:off x="9307235" y="9167108"/>
+            <a:off x="5099901" y="7786006"/>
             <a:ext cx="5461853" cy="277799"/>
           </a:xfrm>
           <a:prstGeom prst="rect">
@@ -4210,7 +4210,7 @@
         </p:nvSpPr>
         <p:spPr>
           <a:xfrm>
-            <a:off x="9307236" y="13084758"/>
+            <a:off x="5099896" y="11703656"/>
             <a:ext cx="5461852" cy="277799"/>
           </a:xfrm>
           <a:prstGeom prst="rect">
@@ -4262,7 +4262,7 @@
         </p:nvSpPr>
         <p:spPr>
           <a:xfrm>
-            <a:off x="9308932" y="5280740"/>
+            <a:off x="5101598" y="3899638"/>
             <a:ext cx="1218677" cy="277799"/>
           </a:xfrm>
           <a:prstGeom prst="rect">
@@ -4314,7 +4314,7 @@
         </p:nvSpPr>
         <p:spPr>
           <a:xfrm>
-            <a:off x="13553793" y="5260426"/>
+            <a:off x="9346459" y="3879324"/>
             <a:ext cx="1218677" cy="277799"/>
           </a:xfrm>
           <a:prstGeom prst="rect">
@@ -4366,7 +4366,7 @@
         </p:nvSpPr>
         <p:spPr>
           <a:xfrm>
-            <a:off x="5247992" y="9000941"/>
+            <a:off x="1040656" y="7619833"/>
             <a:ext cx="1667061" cy="523220"/>
           </a:xfrm>
           <a:prstGeom prst="rect">
@@ -4407,7 +4407,7 @@
         </p:nvCxnSpPr>
         <p:spPr>
           <a:xfrm>
-            <a:off x="9918272" y="2841159"/>
+            <a:off x="5710932" y="1460051"/>
             <a:ext cx="0" cy="10560514"/>
           </a:xfrm>
           <a:prstGeom prst="line">
@@ -4450,7 +4450,7 @@
         </p:nvCxnSpPr>
         <p:spPr>
           <a:xfrm>
-            <a:off x="14175495" y="2841159"/>
+            <a:off x="9968155" y="1460051"/>
             <a:ext cx="0" cy="10560514"/>
           </a:xfrm>
           <a:prstGeom prst="line">
@@ -4493,7 +4493,7 @@
         </p:nvSpPr>
         <p:spPr>
           <a:xfrm>
-            <a:off x="5236627" y="7992436"/>
+            <a:off x="1029287" y="6611334"/>
             <a:ext cx="1861834" cy="982309"/>
           </a:xfrm>
           <a:prstGeom prst="rect">
@@ -4534,7 +4534,7 @@
         </p:nvSpPr>
         <p:spPr>
           <a:xfrm>
-            <a:off x="5249159" y="12918591"/>
+            <a:off x="1041823" y="11537483"/>
             <a:ext cx="1667061" cy="523220"/>
           </a:xfrm>
           <a:prstGeom prst="rect">
@@ -4573,7 +4573,7 @@
         </p:nvSpPr>
         <p:spPr>
           <a:xfrm>
-            <a:off x="5232251" y="11854961"/>
+            <a:off x="1024911" y="10473859"/>
             <a:ext cx="1861834" cy="982309"/>
           </a:xfrm>
           <a:prstGeom prst="rect">
@@ -4614,7 +4614,7 @@
         </p:nvSpPr>
         <p:spPr>
           <a:xfrm>
-            <a:off x="5232251" y="5090909"/>
+            <a:off x="1024915" y="3709801"/>
             <a:ext cx="1667061" cy="523220"/>
           </a:xfrm>
           <a:prstGeom prst="rect">
@@ -4653,7 +4653,7 @@
         </p:nvSpPr>
         <p:spPr>
           <a:xfrm>
-            <a:off x="5249288" y="4093275"/>
+            <a:off x="1041948" y="2712173"/>
             <a:ext cx="1861834" cy="982309"/>
           </a:xfrm>
           <a:prstGeom prst="rect">
@@ -4694,7 +4694,7 @@
         </p:nvSpPr>
         <p:spPr>
           <a:xfrm rot="5400000">
-            <a:off x="11892597" y="9916896"/>
+            <a:off x="7685257" y="8535794"/>
             <a:ext cx="327196" cy="4046123"/>
           </a:xfrm>
           <a:prstGeom prst="leftBrace">
@@ -4739,7 +4739,7 @@
         </p:nvSpPr>
         <p:spPr>
           <a:xfrm>
-            <a:off x="10788533" y="11287791"/>
+            <a:off x="6581193" y="9906683"/>
             <a:ext cx="2544158" cy="523220"/>
           </a:xfrm>
           <a:prstGeom prst="rect">
@@ -4774,7 +4774,7 @@
         </p:nvSpPr>
         <p:spPr>
           <a:xfrm rot="5400000">
-            <a:off x="9423017" y="3846291"/>
+            <a:off x="5215677" y="2465183"/>
             <a:ext cx="327196" cy="519354"/>
           </a:xfrm>
           <a:prstGeom prst="leftBrace">
@@ -4819,7 +4819,7 @@
         </p:nvSpPr>
         <p:spPr>
           <a:xfrm>
-            <a:off x="13463636" y="3464547"/>
+            <a:off x="9256296" y="2083445"/>
             <a:ext cx="651140" cy="461665"/>
           </a:xfrm>
           <a:prstGeom prst="rect">
@@ -4854,7 +4854,7 @@
         </p:nvSpPr>
         <p:spPr>
           <a:xfrm rot="5400000">
-            <a:off x="10104336" y="3846292"/>
+            <a:off x="5896996" y="2465184"/>
             <a:ext cx="327196" cy="519354"/>
           </a:xfrm>
           <a:prstGeom prst="leftBrace">
@@ -4899,7 +4899,7 @@
         </p:nvSpPr>
         <p:spPr>
           <a:xfrm rot="5400000">
-            <a:off x="13655982" y="3851105"/>
+            <a:off x="9448642" y="2469997"/>
             <a:ext cx="327196" cy="519354"/>
           </a:xfrm>
           <a:prstGeom prst="leftBrace">
@@ -4944,7 +4944,7 @@
         </p:nvSpPr>
         <p:spPr>
           <a:xfrm rot="5400000">
-            <a:off x="14337301" y="3851107"/>
+            <a:off x="10129961" y="2469999"/>
             <a:ext cx="327196" cy="519354"/>
           </a:xfrm>
           <a:prstGeom prst="leftBrace">
@@ -4989,7 +4989,7 @@
         </p:nvSpPr>
         <p:spPr>
           <a:xfrm>
-            <a:off x="9925510" y="3509358"/>
+            <a:off x="5718170" y="2128256"/>
             <a:ext cx="651140" cy="461665"/>
           </a:xfrm>
           <a:prstGeom prst="rect">
@@ -5024,7 +5024,7 @@
         </p:nvSpPr>
         <p:spPr>
           <a:xfrm>
-            <a:off x="14144955" y="3464547"/>
+            <a:off x="9937615" y="2083445"/>
             <a:ext cx="651140" cy="461665"/>
           </a:xfrm>
           <a:prstGeom prst="rect">
@@ -5059,7 +5059,7 @@
         </p:nvSpPr>
         <p:spPr>
           <a:xfrm>
-            <a:off x="7026276" y="8221716"/>
+            <a:off x="2818936" y="6840608"/>
             <a:ext cx="2282658" cy="480400"/>
           </a:xfrm>
           <a:prstGeom prst="rect">
@@ -5108,7 +5108,7 @@
         </p:nvSpPr>
         <p:spPr>
           <a:xfrm>
-            <a:off x="14772470" y="8221022"/>
+            <a:off x="10565130" y="6839914"/>
             <a:ext cx="2329276" cy="480400"/>
           </a:xfrm>
           <a:prstGeom prst="rect">
@@ -5157,7 +5157,7 @@
         </p:nvSpPr>
         <p:spPr>
           <a:xfrm rot="5400000">
-            <a:off x="7999451" y="6870844"/>
+            <a:off x="3792111" y="5489736"/>
             <a:ext cx="327196" cy="2282658"/>
           </a:xfrm>
           <a:prstGeom prst="leftBrace">
@@ -5202,7 +5202,7 @@
         </p:nvSpPr>
         <p:spPr>
           <a:xfrm>
-            <a:off x="7737157" y="7414203"/>
+            <a:off x="3529823" y="6033101"/>
             <a:ext cx="806631" cy="461665"/>
           </a:xfrm>
           <a:prstGeom prst="rect">
@@ -5239,7 +5239,7 @@
         </p:nvCxnSpPr>
         <p:spPr>
           <a:xfrm>
-            <a:off x="14772470" y="2808283"/>
+            <a:off x="10565130" y="1427181"/>
             <a:ext cx="0" cy="10593391"/>
           </a:xfrm>
           <a:prstGeom prst="line">
@@ -5285,7 +5285,7 @@
         </p:nvCxnSpPr>
         <p:spPr>
           <a:xfrm>
-            <a:off x="9304378" y="2808283"/>
+            <a:off x="5097044" y="1427181"/>
             <a:ext cx="22559" cy="10593391"/>
           </a:xfrm>
           <a:prstGeom prst="line">
@@ -5329,8 +5329,8 @@
         </p:nvSpPr>
         <p:spPr>
           <a:xfrm>
-            <a:off x="4625218" y="10381581"/>
-            <a:ext cx="3147500" cy="584775"/>
+            <a:off x="417878" y="9000479"/>
+            <a:ext cx="3147500" cy="646331"/>
           </a:xfrm>
           <a:prstGeom prst="rect">
             <a:avLst/>
@@ -5355,7 +5355,7 @@
           <a:lstStyle/>
           <a:p>
             <a:r>
-              <a:rPr lang="en-US" sz="3200" b="1" dirty="0"/>
+              <a:rPr lang="en-US" sz="3600" b="1" dirty="0"/>
               <a:t>SpliceAI-10k-Ns</a:t>
             </a:r>
           </a:p>
@@ -5375,8 +5375,8 @@
         </p:nvSpPr>
         <p:spPr>
           <a:xfrm>
-            <a:off x="4607212" y="6473514"/>
-            <a:ext cx="3147500" cy="584775"/>
+            <a:off x="399872" y="5092412"/>
+            <a:ext cx="3147500" cy="646331"/>
           </a:xfrm>
           <a:prstGeom prst="rect">
             <a:avLst/>
@@ -5401,10 +5401,10 @@
           <a:lstStyle/>
           <a:p>
             <a:r>
-              <a:rPr lang="en-US" sz="3200" b="1" dirty="0" err="1"/>
+              <a:rPr lang="en-US" sz="3600" b="1" dirty="0" err="1"/>
               <a:t>SpliceAI</a:t>
             </a:r>
-            <a:endParaRPr lang="en-US" sz="3200" b="1" dirty="0"/>
+            <a:endParaRPr lang="en-US" sz="3600" b="1" dirty="0"/>
           </a:p>
         </p:txBody>
       </p:sp>
@@ -5422,8 +5422,8 @@
         </p:nvSpPr>
         <p:spPr>
           <a:xfrm>
-            <a:off x="4625218" y="2626276"/>
-            <a:ext cx="3147500" cy="584775"/>
+            <a:off x="417878" y="1245174"/>
+            <a:ext cx="3147500" cy="646331"/>
           </a:xfrm>
           <a:prstGeom prst="rect">
             <a:avLst/>
@@ -5448,8 +5448,8 @@
           <a:lstStyle/>
           <a:p>
             <a:r>
-              <a:rPr lang="en-US" sz="3200" b="1" dirty="0"/>
-              <a:t>SPLAM</a:t>
+              <a:rPr lang="en-US" sz="3600" b="1" dirty="0"/>
+              <a:t>Splam</a:t>
             </a:r>
           </a:p>
         </p:txBody>
@@ -5468,7 +5468,7 @@
         </p:nvSpPr>
         <p:spPr>
           <a:xfrm>
-            <a:off x="9255623" y="7420001"/>
+            <a:off x="5048283" y="6038899"/>
             <a:ext cx="651140" cy="461665"/>
           </a:xfrm>
           <a:prstGeom prst="rect">
@@ -5503,7 +5503,7 @@
         </p:nvSpPr>
         <p:spPr>
           <a:xfrm rot="5400000">
-            <a:off x="9447532" y="7759206"/>
+            <a:off x="5240192" y="6378098"/>
             <a:ext cx="327196" cy="519354"/>
           </a:xfrm>
           <a:prstGeom prst="leftBrace">
@@ -5548,7 +5548,7 @@
         </p:nvSpPr>
         <p:spPr>
           <a:xfrm rot="5400000">
-            <a:off x="8006923" y="10770795"/>
+            <a:off x="3799583" y="9389687"/>
             <a:ext cx="327196" cy="2282658"/>
           </a:xfrm>
           <a:prstGeom prst="leftBrace">
@@ -5593,7 +5593,7 @@
         </p:nvSpPr>
         <p:spPr>
           <a:xfrm>
-            <a:off x="7744629" y="11314154"/>
+            <a:off x="3537295" y="9933052"/>
             <a:ext cx="806631" cy="461665"/>
           </a:xfrm>
           <a:prstGeom prst="rect">
@@ -5628,7 +5628,7 @@
         </p:nvSpPr>
         <p:spPr>
           <a:xfrm>
-            <a:off x="9263096" y="11319952"/>
+            <a:off x="5055756" y="9938850"/>
             <a:ext cx="651140" cy="461665"/>
           </a:xfrm>
           <a:prstGeom prst="rect">
@@ -5663,7 +5663,7 @@
         </p:nvSpPr>
         <p:spPr>
           <a:xfrm rot="5400000">
-            <a:off x="9455004" y="11659156"/>
+            <a:off x="5247664" y="10278048"/>
             <a:ext cx="327196" cy="519354"/>
           </a:xfrm>
           <a:prstGeom prst="leftBrace">
@@ -5708,7 +5708,7 @@
         </p:nvSpPr>
         <p:spPr>
           <a:xfrm rot="5400000">
-            <a:off x="14324093" y="7740150"/>
+            <a:off x="10116753" y="6359042"/>
             <a:ext cx="327196" cy="519354"/>
           </a:xfrm>
           <a:prstGeom prst="leftBrace">
@@ -5753,7 +5753,7 @@
         </p:nvSpPr>
         <p:spPr>
           <a:xfrm>
-            <a:off x="14131747" y="7353590"/>
+            <a:off x="9924407" y="5972488"/>
             <a:ext cx="651140" cy="461665"/>
           </a:xfrm>
           <a:prstGeom prst="rect">
@@ -5788,7 +5788,7 @@
         </p:nvSpPr>
         <p:spPr>
           <a:xfrm rot="5400000">
-            <a:off x="15811303" y="10781566"/>
+            <a:off x="11603963" y="9400464"/>
             <a:ext cx="327196" cy="2284575"/>
           </a:xfrm>
           <a:prstGeom prst="leftBrace">
@@ -5833,7 +5833,7 @@
         </p:nvSpPr>
         <p:spPr>
           <a:xfrm>
-            <a:off x="15519257" y="11275560"/>
+            <a:off x="11311923" y="9894458"/>
             <a:ext cx="806631" cy="461665"/>
           </a:xfrm>
           <a:prstGeom prst="rect">
@@ -5869,7 +5869,7 @@
         </p:nvSpPr>
         <p:spPr>
           <a:xfrm rot="5400000">
-            <a:off x="14345813" y="11662120"/>
+            <a:off x="10138473" y="10281012"/>
             <a:ext cx="327196" cy="519354"/>
           </a:xfrm>
           <a:prstGeom prst="leftBrace">
@@ -5914,7 +5914,7 @@
         </p:nvSpPr>
         <p:spPr>
           <a:xfrm>
-            <a:off x="14153467" y="11275560"/>
+            <a:off x="9946127" y="9894458"/>
             <a:ext cx="651140" cy="461665"/>
           </a:xfrm>
           <a:prstGeom prst="rect">
@@ -5949,7 +5949,7 @@
         </p:nvSpPr>
         <p:spPr>
           <a:xfrm>
-            <a:off x="4191596" y="1171557"/>
+            <a:off x="-15743" y="-209550"/>
             <a:ext cx="627095" cy="1169551"/>
           </a:xfrm>
           <a:prstGeom prst="rect">
@@ -5984,7 +5984,7 @@
         </p:nvSpPr>
         <p:spPr>
           <a:xfrm>
-            <a:off x="17990296" y="1262996"/>
+            <a:off x="13782956" y="-118110"/>
             <a:ext cx="604090" cy="1169551"/>
           </a:xfrm>
           <a:prstGeom prst="rect">
@@ -6019,7 +6019,7 @@
         </p:nvSpPr>
         <p:spPr>
           <a:xfrm>
-            <a:off x="20682446" y="1650015"/>
+            <a:off x="16475106" y="268912"/>
             <a:ext cx="3429262" cy="584775"/>
           </a:xfrm>
           <a:prstGeom prst="rect">
@@ -6062,7 +6062,7 @@
         </p:nvSpPr>
         <p:spPr>
           <a:xfrm>
-            <a:off x="20976405" y="7983555"/>
+            <a:off x="16769065" y="6602453"/>
             <a:ext cx="2844132" cy="584775"/>
           </a:xfrm>
           <a:prstGeom prst="rect">
@@ -6082,7 +6082,7 @@
                 <a:latin typeface="Microsoft JhengHei UI" panose="020B0604030504040204" pitchFamily="34" charset="-120"/>
                 <a:ea typeface="Microsoft JhengHei UI" panose="020B0604030504040204" pitchFamily="34" charset="-120"/>
               </a:rPr>
-              <a:t>Positive_ALT</a:t>
+              <a:t>Positive_Alt</a:t>
             </a:r>
             <a:endParaRPr lang="en-US" sz="3200" b="1" dirty="0">
               <a:latin typeface="Microsoft JhengHei UI" panose="020B0604030504040204" pitchFamily="34" charset="-120"/>

</xml_diff>